<commit_message>
Update: appendix A: addition + Ch. 4: convergence figures modified
</commit_message>
<xml_diff>
--- a/etat_avancement_manuscript_these.pptx
+++ b/etat_avancement_manuscript_these.pptx
@@ -347,7 +347,7 @@
             <a:fld id="{D680E798-53FF-4C51-A981-953463752515}" type="datetimeFigureOut">
               <a:rPr lang="fr-FR" smtClean="0"/>
               <a:pPr/>
-              <a:t>23/05/2021</a:t>
+              <a:t>01/06/2021</a:t>
             </a:fld>
             <a:endParaRPr lang="fr-FR" dirty="0"/>
           </a:p>
@@ -19227,734 +19227,6 @@
           </a:p>
         </p:txBody>
       </p:sp>
-      <p:sp>
-        <p:nvSpPr>
-          <p:cNvPr id="17" name="ZoneTexte 16"/>
-          <p:cNvSpPr txBox="1"/>
-          <p:nvPr/>
-        </p:nvSpPr>
-        <p:spPr>
-          <a:xfrm>
-            <a:off x="4932040" y="0"/>
-            <a:ext cx="3629520" cy="4832092"/>
-          </a:xfrm>
-          <a:prstGeom prst="rect">
-            <a:avLst/>
-          </a:prstGeom>
-          <a:noFill/>
-        </p:spPr>
-        <p:txBody>
-          <a:bodyPr wrap="none" rtlCol="0">
-            <a:spAutoFit/>
-          </a:bodyPr>
-          <a:lstStyle/>
-          <a:p>
-            <a:r>
-              <a:rPr lang="en-US" sz="700" b="1" dirty="0"/>
-              <a:t>II Building lagrangian injectors from resolved atomization simulations </a:t>
-            </a:r>
-            <a:r>
-              <a:rPr lang="en-US" sz="700" b="1" dirty="0" smtClean="0"/>
-              <a:t>8</a:t>
-            </a:r>
-          </a:p>
-          <a:p>
-            <a:endParaRPr lang="en-US" sz="700" b="1" dirty="0" smtClean="0"/>
-          </a:p>
-          <a:p>
-            <a:endParaRPr lang="en-US" sz="700" b="1" dirty="0"/>
-          </a:p>
-          <a:p>
-            <a:endParaRPr lang="en-US" sz="700" b="1" dirty="0"/>
-          </a:p>
-          <a:p>
-            <a:r>
-              <a:rPr lang="fr-FR" sz="700" b="1" dirty="0"/>
-              <a:t>4 </a:t>
-            </a:r>
-            <a:r>
-              <a:rPr lang="fr-FR" sz="700" b="1" dirty="0" err="1"/>
-              <a:t>Models</a:t>
-            </a:r>
-            <a:r>
-              <a:rPr lang="fr-FR" sz="700" b="1" dirty="0"/>
-              <a:t> for lagrangian injection 9</a:t>
-            </a:r>
-          </a:p>
-          <a:p>
-            <a:r>
-              <a:rPr lang="fr-FR" sz="700" dirty="0" smtClean="0"/>
-              <a:t>  </a:t>
-            </a:r>
-            <a:r>
-              <a:rPr lang="fr-FR" sz="700" dirty="0" smtClean="0">
-                <a:solidFill>
-                  <a:srgbClr val="00B0F0"/>
-                </a:solidFill>
-              </a:rPr>
-              <a:t>4.1 </a:t>
-            </a:r>
-            <a:r>
-              <a:rPr lang="fr-FR" sz="700" dirty="0">
-                <a:solidFill>
-                  <a:srgbClr val="00B0F0"/>
-                </a:solidFill>
-              </a:rPr>
-              <a:t>Introduction . . . . . . . . . . . . . . . . . . . . . . . . . . . . . . . . . . . . . . . . . . . . . . 9</a:t>
-            </a:r>
-          </a:p>
-          <a:p>
-            <a:r>
-              <a:rPr lang="en-US" sz="700" dirty="0" smtClean="0">
-                <a:solidFill>
-                  <a:srgbClr val="00B0F0"/>
-                </a:solidFill>
-              </a:rPr>
-              <a:t>  4.2 </a:t>
-            </a:r>
-            <a:r>
-              <a:rPr lang="en-US" sz="700" dirty="0">
-                <a:solidFill>
-                  <a:srgbClr val="00B0F0"/>
-                </a:solidFill>
-              </a:rPr>
-              <a:t>Description of sprays . . . . . . . . . . . . . . . . . . . . . . . . . . . . . . . . . . . . . . . . . 9</a:t>
-            </a:r>
-          </a:p>
-          <a:p>
-            <a:r>
-              <a:rPr lang="fr-FR" sz="700" dirty="0" smtClean="0">
-                <a:solidFill>
-                  <a:srgbClr val="00B0F0"/>
-                </a:solidFill>
-              </a:rPr>
-              <a:t>  4.3 </a:t>
-            </a:r>
-            <a:r>
-              <a:rPr lang="fr-FR" sz="700" dirty="0" err="1">
-                <a:solidFill>
-                  <a:srgbClr val="00B0F0"/>
-                </a:solidFill>
-              </a:rPr>
-              <a:t>Models</a:t>
-            </a:r>
-            <a:r>
-              <a:rPr lang="fr-FR" sz="700" dirty="0">
-                <a:solidFill>
-                  <a:srgbClr val="00B0F0"/>
-                </a:solidFill>
-              </a:rPr>
-              <a:t> </a:t>
-            </a:r>
-            <a:r>
-              <a:rPr lang="fr-FR" sz="700" dirty="0" err="1">
-                <a:solidFill>
-                  <a:srgbClr val="00B0F0"/>
-                </a:solidFill>
-              </a:rPr>
-              <a:t>flowchart</a:t>
-            </a:r>
-            <a:r>
-              <a:rPr lang="fr-FR" sz="700" dirty="0">
-                <a:solidFill>
-                  <a:srgbClr val="00B0F0"/>
-                </a:solidFill>
-              </a:rPr>
-              <a:t> . . . . . . . . . . . . . . . . . . . . . . . . . . . . . . . . . . . . . . . . . . . 9</a:t>
-            </a:r>
-          </a:p>
-          <a:p>
-            <a:r>
-              <a:rPr lang="fr-FR" sz="700" dirty="0" smtClean="0">
-                <a:solidFill>
-                  <a:srgbClr val="00B0F0"/>
-                </a:solidFill>
-              </a:rPr>
-              <a:t>  4.4 </a:t>
-            </a:r>
-            <a:r>
-              <a:rPr lang="fr-FR" sz="700" dirty="0">
-                <a:solidFill>
-                  <a:srgbClr val="00B0F0"/>
-                </a:solidFill>
-              </a:rPr>
-              <a:t>Building </a:t>
-            </a:r>
-            <a:r>
-              <a:rPr lang="fr-FR" sz="700" dirty="0" err="1">
-                <a:solidFill>
-                  <a:srgbClr val="00B0F0"/>
-                </a:solidFill>
-              </a:rPr>
-              <a:t>injectors</a:t>
-            </a:r>
-            <a:r>
-              <a:rPr lang="fr-FR" sz="700" dirty="0">
-                <a:solidFill>
-                  <a:srgbClr val="00B0F0"/>
-                </a:solidFill>
-              </a:rPr>
-              <a:t> . . . . . . . . . . . . . . . . . . . . . . . . . . . . . . . . . . . . . . . . . . . 10</a:t>
-            </a:r>
-          </a:p>
-          <a:p>
-            <a:r>
-              <a:rPr lang="fr-FR" sz="700" dirty="0" smtClean="0">
-                <a:solidFill>
-                  <a:srgbClr val="00B0F0"/>
-                </a:solidFill>
-              </a:rPr>
-              <a:t>    </a:t>
-            </a:r>
-            <a:r>
-              <a:rPr lang="fr-FR" sz="700" dirty="0" smtClean="0">
-                <a:solidFill>
-                  <a:srgbClr val="00B050"/>
-                </a:solidFill>
-              </a:rPr>
-              <a:t>4.4.1 </a:t>
-            </a:r>
-            <a:r>
-              <a:rPr lang="fr-FR" sz="700" dirty="0">
-                <a:solidFill>
-                  <a:srgbClr val="00B050"/>
-                </a:solidFill>
-              </a:rPr>
-              <a:t>Spray </a:t>
-            </a:r>
-            <a:r>
-              <a:rPr lang="fr-FR" sz="700" dirty="0" err="1">
-                <a:solidFill>
-                  <a:srgbClr val="00B050"/>
-                </a:solidFill>
-              </a:rPr>
-              <a:t>sampling</a:t>
-            </a:r>
-            <a:r>
-              <a:rPr lang="fr-FR" sz="700" dirty="0">
-                <a:solidFill>
-                  <a:srgbClr val="00B050"/>
-                </a:solidFill>
-              </a:rPr>
-              <a:t> . . . . . . . . . . . . . . . . . . . . . . . . . . . . . . . . . . . . . . . . 10</a:t>
-            </a:r>
-          </a:p>
-          <a:p>
-            <a:r>
-              <a:rPr lang="fr-FR" sz="700" dirty="0" smtClean="0">
-                <a:solidFill>
-                  <a:srgbClr val="FF0000"/>
-                </a:solidFill>
-              </a:rPr>
-              <a:t>    4.4.2 </a:t>
-            </a:r>
-            <a:r>
-              <a:rPr lang="fr-FR" sz="700" dirty="0">
-                <a:solidFill>
-                  <a:srgbClr val="FF0000"/>
-                </a:solidFill>
-              </a:rPr>
-              <a:t>Spray convergence . . . . . . . . . . . . . . . . . . . . . . . . . . . . . . . . . . . . . . 10</a:t>
-            </a:r>
-          </a:p>
-          <a:p>
-            <a:r>
-              <a:rPr lang="en-US" sz="700" dirty="0" smtClean="0"/>
-              <a:t>    4.4.3 </a:t>
-            </a:r>
-            <a:r>
-              <a:rPr lang="en-US" sz="700" dirty="0"/>
-              <a:t>Spatial discretization of sprays . . . . . . . . . . . . . . . . . . . . . . . . . . . . . . . 11</a:t>
-            </a:r>
-          </a:p>
-          <a:p>
-            <a:r>
-              <a:rPr lang="fr-FR" sz="700" dirty="0" smtClean="0"/>
-              <a:t>    4.4.4 </a:t>
-            </a:r>
-            <a:r>
-              <a:rPr lang="fr-FR" sz="700" dirty="0" err="1"/>
-              <a:t>Injectors</a:t>
-            </a:r>
-            <a:r>
-              <a:rPr lang="fr-FR" sz="700" dirty="0"/>
-              <a:t> </a:t>
-            </a:r>
-            <a:r>
-              <a:rPr lang="fr-FR" sz="700" dirty="0" err="1"/>
-              <a:t>definition</a:t>
-            </a:r>
-            <a:r>
-              <a:rPr lang="fr-FR" sz="700" dirty="0"/>
-              <a:t> . . . . . . . . . . . . . . . . . . . . . . . . . . . . . . . . . . . . . . 11</a:t>
-            </a:r>
-          </a:p>
-          <a:p>
-            <a:r>
-              <a:rPr lang="fr-FR" sz="700" dirty="0" smtClean="0"/>
-              <a:t>  4.5 </a:t>
-            </a:r>
-            <a:r>
-              <a:rPr lang="fr-FR" sz="700" dirty="0"/>
-              <a:t>Dense </a:t>
-            </a:r>
-            <a:r>
-              <a:rPr lang="fr-FR" sz="700" dirty="0" err="1"/>
-              <a:t>core</a:t>
-            </a:r>
-            <a:r>
-              <a:rPr lang="fr-FR" sz="700" dirty="0"/>
-              <a:t> </a:t>
-            </a:r>
-            <a:r>
-              <a:rPr lang="fr-FR" sz="700" dirty="0" err="1"/>
-              <a:t>blockage</a:t>
-            </a:r>
-            <a:r>
-              <a:rPr lang="fr-FR" sz="700" dirty="0"/>
-              <a:t> </a:t>
-            </a:r>
-            <a:r>
-              <a:rPr lang="fr-FR" sz="700" dirty="0" err="1"/>
-              <a:t>effect</a:t>
-            </a:r>
-            <a:r>
-              <a:rPr lang="fr-FR" sz="700" dirty="0"/>
-              <a:t> </a:t>
-            </a:r>
-            <a:r>
-              <a:rPr lang="fr-FR" sz="700" dirty="0" err="1"/>
-              <a:t>modeling</a:t>
-            </a:r>
-            <a:r>
-              <a:rPr lang="fr-FR" sz="700" dirty="0"/>
-              <a:t> . . . . . . . . . . . . . . . . . . . . . . . . . . . . . . . . 12</a:t>
-            </a:r>
-          </a:p>
-          <a:p>
-            <a:r>
-              <a:rPr lang="en-US" sz="700" dirty="0" smtClean="0"/>
-              <a:t>    </a:t>
-            </a:r>
-            <a:r>
-              <a:rPr lang="en-US" sz="700" dirty="0" smtClean="0">
-                <a:solidFill>
-                  <a:srgbClr val="00B0F0"/>
-                </a:solidFill>
-              </a:rPr>
-              <a:t>4.5.1 </a:t>
-            </a:r>
-            <a:r>
-              <a:rPr lang="en-US" sz="700" dirty="0">
-                <a:solidFill>
-                  <a:srgbClr val="00B0F0"/>
-                </a:solidFill>
-              </a:rPr>
-              <a:t>Actuator Line Method . . . . . . . . . . . . . . . . . . . . . . . . . . . . . . . . . . . . 12</a:t>
-            </a:r>
-          </a:p>
-          <a:p>
-            <a:r>
-              <a:rPr lang="en-US" sz="700" dirty="0" smtClean="0"/>
-              <a:t>    4.5.2 </a:t>
-            </a:r>
-            <a:r>
-              <a:rPr lang="en-US" sz="700" dirty="0"/>
-              <a:t>Dense core representation as an actuator . . . . . . . . . . . . . . . . . . . . . . . . . . 12</a:t>
-            </a:r>
-          </a:p>
-          <a:p>
-            <a:r>
-              <a:rPr lang="fr-FR" sz="700" dirty="0" smtClean="0"/>
-              <a:t>    4.5.3 </a:t>
-            </a:r>
-            <a:r>
-              <a:rPr lang="fr-FR" sz="700" dirty="0"/>
-              <a:t>Forces </a:t>
-            </a:r>
-            <a:r>
-              <a:rPr lang="fr-FR" sz="700" dirty="0" err="1"/>
-              <a:t>determination</a:t>
-            </a:r>
-            <a:r>
-              <a:rPr lang="fr-FR" sz="700" dirty="0"/>
-              <a:t> . . . . . . . . . . . . . . . . . . . . . . . . . . . . . . . . . . . . . </a:t>
-            </a:r>
-            <a:r>
-              <a:rPr lang="fr-FR" sz="700" dirty="0" smtClean="0"/>
-              <a:t>12</a:t>
-            </a:r>
-            <a:endParaRPr lang="fr-FR" sz="700" dirty="0"/>
-          </a:p>
-          <a:p>
-            <a:r>
-              <a:rPr lang="en-US" sz="700" dirty="0" smtClean="0"/>
-              <a:t>  </a:t>
-            </a:r>
-            <a:r>
-              <a:rPr lang="en-US" sz="700" dirty="0" smtClean="0">
-                <a:solidFill>
-                  <a:srgbClr val="00B050"/>
-                </a:solidFill>
-              </a:rPr>
-              <a:t>4.6 </a:t>
-            </a:r>
-            <a:r>
-              <a:rPr lang="en-US" sz="700" dirty="0">
-                <a:solidFill>
-                  <a:srgbClr val="00B050"/>
-                </a:solidFill>
-              </a:rPr>
-              <a:t>Secondary atomization modeling . . . . . . . . . . . . . . . . . . . . . . . . . . . . . . . . . . 12</a:t>
-            </a:r>
-          </a:p>
-          <a:p>
-            <a:r>
-              <a:rPr lang="en-US" sz="700" dirty="0" smtClean="0">
-                <a:solidFill>
-                  <a:srgbClr val="00B050"/>
-                </a:solidFill>
-              </a:rPr>
-              <a:t>    4.6.1 </a:t>
-            </a:r>
-            <a:r>
-              <a:rPr lang="en-US" sz="700" dirty="0">
-                <a:solidFill>
-                  <a:srgbClr val="00B050"/>
-                </a:solidFill>
-              </a:rPr>
-              <a:t>Taylor Analogy Breakup . . . . . . . . . . . . . . . . . . . . . . . . . . . . . . . . . . . 12</a:t>
-            </a:r>
-          </a:p>
-          <a:p>
-            <a:r>
-              <a:rPr lang="fr-FR" sz="700" dirty="0" smtClean="0">
-                <a:solidFill>
-                  <a:srgbClr val="00B050"/>
-                </a:solidFill>
-              </a:rPr>
-              <a:t>    4.6.2 </a:t>
-            </a:r>
-            <a:r>
-              <a:rPr lang="fr-FR" sz="700" dirty="0" err="1">
-                <a:solidFill>
-                  <a:srgbClr val="00B050"/>
-                </a:solidFill>
-              </a:rPr>
-              <a:t>Enhanced</a:t>
-            </a:r>
-            <a:r>
-              <a:rPr lang="fr-FR" sz="700" dirty="0">
-                <a:solidFill>
-                  <a:srgbClr val="00B050"/>
-                </a:solidFill>
-              </a:rPr>
-              <a:t> TAB model . . . . . . . . . . . . . . . . . . . . . . . . . . . . . . . . . . . . 15</a:t>
-            </a:r>
-          </a:p>
-          <a:p>
-            <a:r>
-              <a:rPr lang="fr-FR" sz="700" dirty="0" smtClean="0">
-                <a:solidFill>
-                  <a:srgbClr val="00B050"/>
-                </a:solidFill>
-              </a:rPr>
-              <a:t>    4.6.3 </a:t>
-            </a:r>
-            <a:r>
-              <a:rPr lang="fr-FR" sz="700" dirty="0" err="1">
-                <a:solidFill>
-                  <a:srgbClr val="00B050"/>
-                </a:solidFill>
-              </a:rPr>
-              <a:t>Gorokhovski</a:t>
-            </a:r>
-            <a:r>
-              <a:rPr lang="fr-FR" sz="700" dirty="0">
-                <a:solidFill>
-                  <a:srgbClr val="00B050"/>
-                </a:solidFill>
-              </a:rPr>
-              <a:t> </a:t>
-            </a:r>
-            <a:r>
-              <a:rPr lang="fr-FR" sz="700" dirty="0" err="1">
-                <a:solidFill>
-                  <a:srgbClr val="00B050"/>
-                </a:solidFill>
-              </a:rPr>
-              <a:t>stochastic</a:t>
-            </a:r>
-            <a:r>
-              <a:rPr lang="fr-FR" sz="700" dirty="0">
-                <a:solidFill>
-                  <a:srgbClr val="00B050"/>
-                </a:solidFill>
-              </a:rPr>
-              <a:t> model . . . . . . . . . . . . . . . . . . . . . . . . . . . . . . . . </a:t>
-            </a:r>
-            <a:r>
-              <a:rPr lang="fr-FR" sz="700" dirty="0" smtClean="0">
-                <a:solidFill>
-                  <a:srgbClr val="00B050"/>
-                </a:solidFill>
-              </a:rPr>
-              <a:t>15</a:t>
-            </a:r>
-          </a:p>
-          <a:p>
-            <a:r>
-              <a:rPr lang="fr-FR" sz="700" dirty="0" smtClean="0"/>
-              <a:t>  4.7 </a:t>
-            </a:r>
-            <a:r>
-              <a:rPr lang="fr-FR" sz="700" dirty="0" err="1"/>
-              <a:t>Subgrid</a:t>
-            </a:r>
-            <a:r>
-              <a:rPr lang="fr-FR" sz="700" dirty="0"/>
-              <a:t> </a:t>
-            </a:r>
-            <a:r>
-              <a:rPr lang="fr-FR" sz="700" dirty="0" err="1"/>
-              <a:t>models</a:t>
-            </a:r>
-            <a:r>
-              <a:rPr lang="fr-FR" sz="700" dirty="0"/>
-              <a:t> for turbulent dispersion . . . . . . . . . . . . . . . . . . . . . . . . . . . . . . 17</a:t>
-            </a:r>
-          </a:p>
-          <a:p>
-            <a:r>
-              <a:rPr lang="fr-FR" sz="700" dirty="0" smtClean="0"/>
-              <a:t>  4.8 </a:t>
-            </a:r>
-            <a:r>
-              <a:rPr lang="fr-FR" sz="700" dirty="0"/>
-              <a:t>Conclusions . . . . . . . . . . . . . . . . . . . . . . . . . . . . . . . . . . . . . . . . . . . . . . </a:t>
-            </a:r>
-            <a:r>
-              <a:rPr lang="fr-FR" sz="700" dirty="0" smtClean="0"/>
-              <a:t>18</a:t>
-            </a:r>
-          </a:p>
-          <a:p>
-            <a:endParaRPr lang="fr-FR" sz="700" dirty="0" smtClean="0"/>
-          </a:p>
-          <a:p>
-            <a:endParaRPr lang="fr-FR" sz="700" dirty="0" smtClean="0"/>
-          </a:p>
-          <a:p>
-            <a:endParaRPr lang="fr-FR" sz="700" dirty="0"/>
-          </a:p>
-          <a:p>
-            <a:endParaRPr lang="fr-FR" sz="700" dirty="0"/>
-          </a:p>
-          <a:p>
-            <a:r>
-              <a:rPr lang="en-US" sz="700" b="1" dirty="0"/>
-              <a:t>5 Learning data from a resolved liquid jet in crossflow 19</a:t>
-            </a:r>
-          </a:p>
-          <a:p>
-            <a:r>
-              <a:rPr lang="fr-FR" sz="700" dirty="0"/>
-              <a:t>5.1 Introduction . . . . . . . . . . . . . . . . . . . . . . . . . . . . . . . . . . . . . . . . . . . . . . 20</a:t>
-            </a:r>
-          </a:p>
-          <a:p>
-            <a:r>
-              <a:rPr lang="en-US" sz="700" dirty="0"/>
-              <a:t>5.2 Experimental test case . . . . . . . . . . . . . . . . . . . . . . . . . . . . . . . . . . . . . . . . 20</a:t>
-            </a:r>
-          </a:p>
-          <a:p>
-            <a:r>
-              <a:rPr lang="fr-FR" sz="700" dirty="0"/>
-              <a:t>5.3 </a:t>
-            </a:r>
-            <a:r>
-              <a:rPr lang="fr-FR" sz="700" dirty="0" err="1"/>
-              <a:t>Computational</a:t>
-            </a:r>
-            <a:r>
-              <a:rPr lang="fr-FR" sz="700" dirty="0"/>
-              <a:t> setup . . . . . . . . . . . . . . . . . . . . . . . . . . . . . . . . . . . . . . . . . 20</a:t>
-            </a:r>
-          </a:p>
-          <a:p>
-            <a:r>
-              <a:rPr lang="fr-FR" sz="700" dirty="0" smtClean="0"/>
-              <a:t>5.4 </a:t>
-            </a:r>
-            <a:r>
-              <a:rPr lang="fr-FR" sz="700" dirty="0" err="1"/>
-              <a:t>Results</a:t>
-            </a:r>
-            <a:r>
-              <a:rPr lang="fr-FR" sz="700" dirty="0"/>
-              <a:t> . . . . . . . . . . . . . . . . . . . . . . . . . . . . . . . . . . . . . . . . . . . . . . . . . 20</a:t>
-            </a:r>
-          </a:p>
-          <a:p>
-            <a:r>
-              <a:rPr lang="en-US" sz="700" dirty="0" smtClean="0"/>
-              <a:t>  5.4.1 </a:t>
-            </a:r>
-            <a:r>
-              <a:rPr lang="en-US" sz="700" dirty="0"/>
-              <a:t>Validation with experimental trajectory . . . . . . . . . . . . . . . . . . . . . . . . . . 20</a:t>
-            </a:r>
-          </a:p>
-          <a:p>
-            <a:r>
-              <a:rPr lang="en-US" sz="700" dirty="0" smtClean="0"/>
-              <a:t>  5.4.2 </a:t>
-            </a:r>
-            <a:r>
-              <a:rPr lang="en-US" sz="700" dirty="0"/>
-              <a:t>Jet topology and breakup . . . . . . . . . . . . . . . . . . . . . . . . . . . . . . . . . . 20</a:t>
-            </a:r>
-          </a:p>
-          <a:p>
-            <a:r>
-              <a:rPr lang="en-US" sz="700" dirty="0" smtClean="0"/>
-              <a:t>    5.4.2.1 </a:t>
-            </a:r>
-            <a:r>
-              <a:rPr lang="en-US" sz="700" dirty="0"/>
-              <a:t>Effect of mesh . . . . . . . . . . . . . . . . . . . . . . . . . . . . . . . . . . . 20</a:t>
-            </a:r>
-          </a:p>
-          <a:p>
-            <a:r>
-              <a:rPr lang="en-US" sz="700" dirty="0" smtClean="0"/>
-              <a:t>    5.4.2.2 </a:t>
-            </a:r>
-            <a:r>
-              <a:rPr lang="en-US" sz="700" dirty="0"/>
-              <a:t>Effect of operating point . . . . . . . . . . . . . . . . . . . . . . . . . . . . . 20</a:t>
-            </a:r>
-          </a:p>
-          <a:p>
-            <a:r>
-              <a:rPr lang="fr-FR" sz="700" dirty="0" smtClean="0"/>
-              <a:t>  5.4.3 </a:t>
-            </a:r>
-            <a:r>
-              <a:rPr lang="fr-FR" sz="700" dirty="0"/>
-              <a:t>Spray </a:t>
-            </a:r>
-            <a:r>
-              <a:rPr lang="fr-FR" sz="700" dirty="0" err="1"/>
-              <a:t>characterization</a:t>
-            </a:r>
-            <a:r>
-              <a:rPr lang="fr-FR" sz="700" dirty="0"/>
-              <a:t> . . . . . . . . . . . . . . . . . . . . . . . . . . . . . . . . . . . . 20</a:t>
-            </a:r>
-          </a:p>
-          <a:p>
-            <a:r>
-              <a:rPr lang="fr-FR" sz="700" dirty="0" smtClean="0"/>
-              <a:t>    5.4.3.1 </a:t>
-            </a:r>
-            <a:r>
-              <a:rPr lang="fr-FR" sz="700" dirty="0" err="1"/>
-              <a:t>Sampling</a:t>
-            </a:r>
-            <a:r>
-              <a:rPr lang="fr-FR" sz="700" dirty="0"/>
-              <a:t> </a:t>
-            </a:r>
-            <a:r>
-              <a:rPr lang="fr-FR" sz="700" dirty="0" err="1"/>
-              <a:t>procedure</a:t>
-            </a:r>
-            <a:r>
-              <a:rPr lang="fr-FR" sz="700" dirty="0"/>
-              <a:t> for </a:t>
-            </a:r>
-            <a:r>
-              <a:rPr lang="fr-FR" sz="700" dirty="0" err="1"/>
-              <a:t>droplets</a:t>
-            </a:r>
-            <a:r>
-              <a:rPr lang="fr-FR" sz="700" dirty="0"/>
-              <a:t> . . . . . . . . . . . . . . . . . . . . . . . . . 20</a:t>
-            </a:r>
-          </a:p>
-          <a:p>
-            <a:r>
-              <a:rPr lang="fr-FR" sz="700" dirty="0" smtClean="0"/>
-              <a:t>    5.4.3.2 </a:t>
-            </a:r>
-            <a:r>
-              <a:rPr lang="fr-FR" sz="700" dirty="0" err="1"/>
-              <a:t>Droplets</a:t>
-            </a:r>
-            <a:r>
-              <a:rPr lang="fr-FR" sz="700" dirty="0"/>
-              <a:t> size distributions . . . . . . . . . . . . . . . . . . . . . . . . . . . . 20</a:t>
-            </a:r>
-          </a:p>
-          <a:p>
-            <a:r>
-              <a:rPr lang="en-US" sz="700" dirty="0" smtClean="0"/>
-              <a:t>    5.4.3.3 </a:t>
-            </a:r>
-            <a:r>
-              <a:rPr lang="en-US" sz="700" dirty="0"/>
-              <a:t>Direct measurement of fluxes (interior boundaries) . . . . . . . . . . . . . . . 20</a:t>
-            </a:r>
-          </a:p>
-          <a:p>
-            <a:r>
-              <a:rPr lang="en-US" sz="700" dirty="0" smtClean="0"/>
-              <a:t>  5.4.4 </a:t>
-            </a:r>
-            <a:r>
-              <a:rPr lang="en-US" sz="700" dirty="0"/>
-              <a:t>Mass conservation in ACLS . . . . . . . . . . . . . . . . . . . . . . . . . . . . . . . . . 20</a:t>
-            </a:r>
-          </a:p>
-          <a:p>
-            <a:r>
-              <a:rPr lang="fr-FR" sz="700" dirty="0" smtClean="0"/>
-              <a:t>  5.4.5 </a:t>
-            </a:r>
-            <a:r>
-              <a:rPr lang="fr-FR" sz="700" dirty="0" err="1"/>
-              <a:t>Computational</a:t>
-            </a:r>
-            <a:r>
-              <a:rPr lang="fr-FR" sz="700" dirty="0"/>
-              <a:t> performances . . . . . . . . . . . . . . . . . . . . . . . . . . . . . . . . 20</a:t>
-            </a:r>
-          </a:p>
-          <a:p>
-            <a:r>
-              <a:rPr lang="en-US" sz="700" dirty="0" smtClean="0"/>
-              <a:t>  5.4.6 </a:t>
-            </a:r>
-            <a:r>
-              <a:rPr lang="en-US" sz="700" dirty="0"/>
-              <a:t>Spatial discretization of sprays . . . . . . . . . . . . . . . . . . . . . . . . . . . . . . . 20</a:t>
-            </a:r>
-          </a:p>
-          <a:p>
-            <a:r>
-              <a:rPr lang="fr-FR" sz="700" dirty="0"/>
-              <a:t>5.5 Conclusions . . . . . . . . . . . . . . . . . . . . . . . . . . . . . . . . . . . . . . . . . . . . . . </a:t>
-            </a:r>
-            <a:r>
-              <a:rPr lang="fr-FR" sz="700" dirty="0" smtClean="0"/>
-              <a:t>20</a:t>
-            </a:r>
-            <a:endParaRPr lang="fr-FR" sz="700" dirty="0"/>
-          </a:p>
-        </p:txBody>
-      </p:sp>
       <p:grpSp>
         <p:nvGrpSpPr>
           <p:cNvPr id="19" name="Groupe 18"/>
@@ -20197,7 +19469,7 @@
           <a:p>
             <a:r>
               <a:rPr lang="fr-FR" sz="700" b="1" dirty="0" smtClean="0"/>
-              <a:t>80 %</a:t>
+              <a:t>90 %</a:t>
             </a:r>
             <a:endParaRPr lang="fr-FR" sz="100" dirty="0"/>
           </a:p>
@@ -20241,10 +19513,10 @@
         </p:nvGrpSpPr>
         <p:grpSpPr>
           <a:xfrm>
-            <a:off x="627199" y="973335"/>
-            <a:ext cx="1080120" cy="147289"/>
+            <a:off x="627199" y="973336"/>
+            <a:ext cx="1080120" cy="156898"/>
             <a:chOff x="1115616" y="1300690"/>
-            <a:chExt cx="1584176" cy="216024"/>
+            <a:chExt cx="1584176" cy="230117"/>
           </a:xfrm>
         </p:grpSpPr>
         <p:sp>
@@ -20303,8 +19575,8 @@
           </p:nvSpPr>
           <p:spPr>
             <a:xfrm>
-              <a:off x="1115616" y="1300690"/>
-              <a:ext cx="1252978" cy="216024"/>
+              <a:off x="1115617" y="1300690"/>
+              <a:ext cx="1334728" cy="230117"/>
             </a:xfrm>
             <a:prstGeom prst="rect">
               <a:avLst/>
@@ -20524,9 +19796,9 @@
         <p:grpSpPr>
           <a:xfrm>
             <a:off x="5038401" y="287117"/>
-            <a:ext cx="1099320" cy="147289"/>
-            <a:chOff x="1087456" y="1300690"/>
-            <a:chExt cx="1612336" cy="216024"/>
+            <a:ext cx="1099321" cy="155196"/>
+            <a:chOff x="1087455" y="1300690"/>
+            <a:chExt cx="1612337" cy="227621"/>
           </a:xfrm>
         </p:grpSpPr>
         <p:sp>
@@ -20585,8 +19857,8 @@
           </p:nvSpPr>
           <p:spPr>
             <a:xfrm>
-              <a:off x="1087456" y="1300690"/>
-              <a:ext cx="302591" cy="216024"/>
+              <a:off x="1087455" y="1300690"/>
+              <a:ext cx="477674" cy="227621"/>
             </a:xfrm>
             <a:prstGeom prst="rect">
               <a:avLst/>
@@ -20647,8 +19919,12 @@
           <a:lstStyle/>
           <a:p>
             <a:r>
+              <a:rPr lang="fr-FR" sz="700" b="1" dirty="0"/>
+              <a:t>3</a:t>
+            </a:r>
+            <a:r>
               <a:rPr lang="fr-FR" sz="700" b="1" dirty="0" smtClean="0"/>
-              <a:t>25 %</a:t>
+              <a:t>5 %</a:t>
             </a:r>
             <a:endParaRPr lang="fr-FR" sz="100" dirty="0"/>
           </a:p>
@@ -20662,7 +19938,7 @@
         </p:nvSpPr>
         <p:spPr>
           <a:xfrm>
-            <a:off x="4759317" y="2521901"/>
+            <a:off x="4864732" y="2571750"/>
             <a:ext cx="340158" cy="200055"/>
           </a:xfrm>
           <a:prstGeom prst="rect">
@@ -20677,8 +19953,12 @@
           <a:lstStyle/>
           <a:p>
             <a:r>
+              <a:rPr lang="fr-FR" sz="700" b="1" dirty="0"/>
+              <a:t>5</a:t>
+            </a:r>
+            <a:r>
               <a:rPr lang="fr-FR" sz="700" b="1" dirty="0" smtClean="0"/>
-              <a:t>0 %</a:t>
+              <a:t> %</a:t>
             </a:r>
             <a:endParaRPr lang="fr-FR" sz="100" dirty="0"/>
           </a:p>
@@ -20692,7 +19972,7 @@
         </p:nvGrpSpPr>
         <p:grpSpPr>
           <a:xfrm>
-            <a:off x="4898299" y="2708415"/>
+            <a:off x="5003714" y="2758264"/>
             <a:ext cx="1080120" cy="147289"/>
             <a:chOff x="1115616" y="1300690"/>
             <a:chExt cx="1584176" cy="216024"/>
@@ -20755,7 +20035,7 @@
           <p:spPr>
             <a:xfrm>
               <a:off x="1115616" y="1300690"/>
-              <a:ext cx="67055" cy="216024"/>
+              <a:ext cx="155099" cy="216024"/>
             </a:xfrm>
             <a:prstGeom prst="rect">
               <a:avLst/>
@@ -20823,6 +20103,902 @@
           </a:p>
         </p:txBody>
       </p:sp>
+      <p:sp>
+        <p:nvSpPr>
+          <p:cNvPr id="44" name="ZoneTexte 43"/>
+          <p:cNvSpPr txBox="1"/>
+          <p:nvPr/>
+        </p:nvSpPr>
+        <p:spPr>
+          <a:xfrm>
+            <a:off x="5410600" y="25822"/>
+            <a:ext cx="3629520" cy="5801588"/>
+          </a:xfrm>
+          <a:prstGeom prst="rect">
+            <a:avLst/>
+          </a:prstGeom>
+          <a:noFill/>
+        </p:spPr>
+        <p:txBody>
+          <a:bodyPr wrap="none" rtlCol="0">
+            <a:spAutoFit/>
+          </a:bodyPr>
+          <a:lstStyle/>
+          <a:p>
+            <a:r>
+              <a:rPr lang="en-US" sz="700" b="1" dirty="0"/>
+              <a:t>II Building lagrangian injectors from resolved atomization simulations </a:t>
+            </a:r>
+            <a:r>
+              <a:rPr lang="en-US" sz="700" b="1" dirty="0" smtClean="0"/>
+              <a:t>8</a:t>
+            </a:r>
+          </a:p>
+          <a:p>
+            <a:endParaRPr lang="en-US" sz="700" b="1" dirty="0" smtClean="0"/>
+          </a:p>
+          <a:p>
+            <a:endParaRPr lang="en-US" sz="700" b="1" dirty="0"/>
+          </a:p>
+          <a:p>
+            <a:endParaRPr lang="en-US" sz="700" b="1" dirty="0"/>
+          </a:p>
+          <a:p>
+            <a:r>
+              <a:rPr lang="fr-FR" sz="700" b="1" dirty="0"/>
+              <a:t>4 </a:t>
+            </a:r>
+            <a:r>
+              <a:rPr lang="fr-FR" sz="700" b="1" dirty="0" err="1"/>
+              <a:t>Models</a:t>
+            </a:r>
+            <a:r>
+              <a:rPr lang="fr-FR" sz="700" b="1" dirty="0"/>
+              <a:t> for lagrangian injection 9</a:t>
+            </a:r>
+          </a:p>
+          <a:p>
+            <a:r>
+              <a:rPr lang="fr-FR" sz="700" dirty="0" smtClean="0"/>
+              <a:t>  </a:t>
+            </a:r>
+            <a:r>
+              <a:rPr lang="fr-FR" sz="700" dirty="0" smtClean="0">
+                <a:solidFill>
+                  <a:srgbClr val="00B0F0"/>
+                </a:solidFill>
+              </a:rPr>
+              <a:t>4.1 </a:t>
+            </a:r>
+            <a:r>
+              <a:rPr lang="fr-FR" sz="700" dirty="0">
+                <a:solidFill>
+                  <a:srgbClr val="00B0F0"/>
+                </a:solidFill>
+              </a:rPr>
+              <a:t>Introduction . . . . . . . . . . . . . . . . . . . . . . . . . . . . . . . . . . . . . . . . . . . . . . 9</a:t>
+            </a:r>
+          </a:p>
+          <a:p>
+            <a:r>
+              <a:rPr lang="en-US" sz="700" dirty="0" smtClean="0">
+                <a:solidFill>
+                  <a:srgbClr val="00B0F0"/>
+                </a:solidFill>
+              </a:rPr>
+              <a:t>  4.2 </a:t>
+            </a:r>
+            <a:r>
+              <a:rPr lang="en-US" sz="700" dirty="0">
+                <a:solidFill>
+                  <a:srgbClr val="00B0F0"/>
+                </a:solidFill>
+              </a:rPr>
+              <a:t>Description of sprays . . . . . . . . . . . . . . . . . . . . . . . . . . . . . . . . . . . . . . . . . 9</a:t>
+            </a:r>
+          </a:p>
+          <a:p>
+            <a:r>
+              <a:rPr lang="fr-FR" sz="700" dirty="0" smtClean="0">
+                <a:solidFill>
+                  <a:srgbClr val="00B0F0"/>
+                </a:solidFill>
+              </a:rPr>
+              <a:t>  4.3 </a:t>
+            </a:r>
+            <a:r>
+              <a:rPr lang="fr-FR" sz="700" dirty="0" err="1">
+                <a:solidFill>
+                  <a:srgbClr val="00B0F0"/>
+                </a:solidFill>
+              </a:rPr>
+              <a:t>Models</a:t>
+            </a:r>
+            <a:r>
+              <a:rPr lang="fr-FR" sz="700" dirty="0">
+                <a:solidFill>
+                  <a:srgbClr val="00B0F0"/>
+                </a:solidFill>
+              </a:rPr>
+              <a:t> </a:t>
+            </a:r>
+            <a:r>
+              <a:rPr lang="fr-FR" sz="700" dirty="0" err="1">
+                <a:solidFill>
+                  <a:srgbClr val="00B0F0"/>
+                </a:solidFill>
+              </a:rPr>
+              <a:t>flowchart</a:t>
+            </a:r>
+            <a:r>
+              <a:rPr lang="fr-FR" sz="700" dirty="0">
+                <a:solidFill>
+                  <a:srgbClr val="00B0F0"/>
+                </a:solidFill>
+              </a:rPr>
+              <a:t> . . . . . . . . . . . . . . . . . . . . . . . . . . . . . . . . . . . . . . . . . . . 9</a:t>
+            </a:r>
+          </a:p>
+          <a:p>
+            <a:r>
+              <a:rPr lang="fr-FR" sz="700" dirty="0" smtClean="0">
+                <a:solidFill>
+                  <a:srgbClr val="00B0F0"/>
+                </a:solidFill>
+              </a:rPr>
+              <a:t>  4.4 </a:t>
+            </a:r>
+            <a:r>
+              <a:rPr lang="fr-FR" sz="700" dirty="0">
+                <a:solidFill>
+                  <a:srgbClr val="00B0F0"/>
+                </a:solidFill>
+              </a:rPr>
+              <a:t>Building </a:t>
+            </a:r>
+            <a:r>
+              <a:rPr lang="fr-FR" sz="700" dirty="0" err="1">
+                <a:solidFill>
+                  <a:srgbClr val="00B0F0"/>
+                </a:solidFill>
+              </a:rPr>
+              <a:t>injectors</a:t>
+            </a:r>
+            <a:r>
+              <a:rPr lang="fr-FR" sz="700" dirty="0">
+                <a:solidFill>
+                  <a:srgbClr val="00B0F0"/>
+                </a:solidFill>
+              </a:rPr>
+              <a:t> . . . . . . . . . . . . . . . . . . . . . . . . . . . . . . . . . . . . . . . . . . . 10</a:t>
+            </a:r>
+          </a:p>
+          <a:p>
+            <a:r>
+              <a:rPr lang="fr-FR" sz="700" dirty="0" smtClean="0">
+                <a:solidFill>
+                  <a:srgbClr val="00B0F0"/>
+                </a:solidFill>
+              </a:rPr>
+              <a:t>    </a:t>
+            </a:r>
+            <a:r>
+              <a:rPr lang="fr-FR" sz="700" dirty="0" smtClean="0">
+                <a:solidFill>
+                  <a:srgbClr val="00B050"/>
+                </a:solidFill>
+              </a:rPr>
+              <a:t>4.4.1 </a:t>
+            </a:r>
+            <a:r>
+              <a:rPr lang="fr-FR" sz="700" dirty="0">
+                <a:solidFill>
+                  <a:srgbClr val="00B050"/>
+                </a:solidFill>
+              </a:rPr>
+              <a:t>Spray </a:t>
+            </a:r>
+            <a:r>
+              <a:rPr lang="fr-FR" sz="700" dirty="0" err="1">
+                <a:solidFill>
+                  <a:srgbClr val="00B050"/>
+                </a:solidFill>
+              </a:rPr>
+              <a:t>sampling</a:t>
+            </a:r>
+            <a:r>
+              <a:rPr lang="fr-FR" sz="700" dirty="0">
+                <a:solidFill>
+                  <a:srgbClr val="00B050"/>
+                </a:solidFill>
+              </a:rPr>
+              <a:t> . . . . . . . . . . . . . . . . . . . . . . . . . . . . . . . . . . . . . . . . 10</a:t>
+            </a:r>
+          </a:p>
+          <a:p>
+            <a:r>
+              <a:rPr lang="fr-FR" sz="700" dirty="0" smtClean="0">
+                <a:solidFill>
+                  <a:srgbClr val="FF0000"/>
+                </a:solidFill>
+              </a:rPr>
+              <a:t>    4.4.2 </a:t>
+            </a:r>
+            <a:r>
+              <a:rPr lang="fr-FR" sz="700" dirty="0">
+                <a:solidFill>
+                  <a:srgbClr val="FF0000"/>
+                </a:solidFill>
+              </a:rPr>
+              <a:t>Spray convergence . . . . . . . . . . . . . . . . . . . . . . . . . . . . . . . . . . . . . . 10</a:t>
+            </a:r>
+          </a:p>
+          <a:p>
+            <a:r>
+              <a:rPr lang="en-US" sz="700" dirty="0" smtClean="0"/>
+              <a:t>    4.4.3 </a:t>
+            </a:r>
+            <a:r>
+              <a:rPr lang="en-US" sz="700" dirty="0"/>
+              <a:t>Spatial discretization of sprays . . . . . . . . . . . . . . . . . . . . . . . . . . . . . . . 11</a:t>
+            </a:r>
+          </a:p>
+          <a:p>
+            <a:r>
+              <a:rPr lang="fr-FR" sz="700" dirty="0" smtClean="0"/>
+              <a:t>    4.4.4 </a:t>
+            </a:r>
+            <a:r>
+              <a:rPr lang="fr-FR" sz="700" dirty="0" err="1"/>
+              <a:t>Injectors</a:t>
+            </a:r>
+            <a:r>
+              <a:rPr lang="fr-FR" sz="700" dirty="0"/>
+              <a:t> </a:t>
+            </a:r>
+            <a:r>
+              <a:rPr lang="fr-FR" sz="700" dirty="0" err="1"/>
+              <a:t>definition</a:t>
+            </a:r>
+            <a:r>
+              <a:rPr lang="fr-FR" sz="700" dirty="0"/>
+              <a:t> . . . . . . . . . . . . . . . . . . . . . . . . . . . . . . . . . . . . . . 11</a:t>
+            </a:r>
+          </a:p>
+          <a:p>
+            <a:r>
+              <a:rPr lang="fr-FR" sz="700" dirty="0" smtClean="0">
+                <a:solidFill>
+                  <a:schemeClr val="accent1">
+                    <a:lumMod val="40000"/>
+                    <a:lumOff val="60000"/>
+                  </a:schemeClr>
+                </a:solidFill>
+              </a:rPr>
+              <a:t>  4.5 </a:t>
+            </a:r>
+            <a:r>
+              <a:rPr lang="fr-FR" sz="700" dirty="0">
+                <a:solidFill>
+                  <a:schemeClr val="accent1">
+                    <a:lumMod val="40000"/>
+                    <a:lumOff val="60000"/>
+                  </a:schemeClr>
+                </a:solidFill>
+              </a:rPr>
+              <a:t>Dense </a:t>
+            </a:r>
+            <a:r>
+              <a:rPr lang="fr-FR" sz="700" dirty="0" err="1">
+                <a:solidFill>
+                  <a:schemeClr val="accent1">
+                    <a:lumMod val="40000"/>
+                    <a:lumOff val="60000"/>
+                  </a:schemeClr>
+                </a:solidFill>
+              </a:rPr>
+              <a:t>core</a:t>
+            </a:r>
+            <a:r>
+              <a:rPr lang="fr-FR" sz="700" dirty="0">
+                <a:solidFill>
+                  <a:schemeClr val="accent1">
+                    <a:lumMod val="40000"/>
+                    <a:lumOff val="60000"/>
+                  </a:schemeClr>
+                </a:solidFill>
+              </a:rPr>
+              <a:t> </a:t>
+            </a:r>
+            <a:r>
+              <a:rPr lang="fr-FR" sz="700" dirty="0" err="1">
+                <a:solidFill>
+                  <a:schemeClr val="accent1">
+                    <a:lumMod val="40000"/>
+                    <a:lumOff val="60000"/>
+                  </a:schemeClr>
+                </a:solidFill>
+              </a:rPr>
+              <a:t>blockage</a:t>
+            </a:r>
+            <a:r>
+              <a:rPr lang="fr-FR" sz="700" dirty="0">
+                <a:solidFill>
+                  <a:schemeClr val="accent1">
+                    <a:lumMod val="40000"/>
+                    <a:lumOff val="60000"/>
+                  </a:schemeClr>
+                </a:solidFill>
+              </a:rPr>
+              <a:t> </a:t>
+            </a:r>
+            <a:r>
+              <a:rPr lang="fr-FR" sz="700" dirty="0" err="1">
+                <a:solidFill>
+                  <a:schemeClr val="accent1">
+                    <a:lumMod val="40000"/>
+                    <a:lumOff val="60000"/>
+                  </a:schemeClr>
+                </a:solidFill>
+              </a:rPr>
+              <a:t>effect</a:t>
+            </a:r>
+            <a:r>
+              <a:rPr lang="fr-FR" sz="700" dirty="0">
+                <a:solidFill>
+                  <a:schemeClr val="accent1">
+                    <a:lumMod val="40000"/>
+                    <a:lumOff val="60000"/>
+                  </a:schemeClr>
+                </a:solidFill>
+              </a:rPr>
+              <a:t> </a:t>
+            </a:r>
+            <a:r>
+              <a:rPr lang="fr-FR" sz="700" dirty="0" err="1">
+                <a:solidFill>
+                  <a:schemeClr val="accent1">
+                    <a:lumMod val="40000"/>
+                    <a:lumOff val="60000"/>
+                  </a:schemeClr>
+                </a:solidFill>
+              </a:rPr>
+              <a:t>modeling</a:t>
+            </a:r>
+            <a:r>
+              <a:rPr lang="fr-FR" sz="700" dirty="0">
+                <a:solidFill>
+                  <a:schemeClr val="accent1">
+                    <a:lumMod val="40000"/>
+                    <a:lumOff val="60000"/>
+                  </a:schemeClr>
+                </a:solidFill>
+              </a:rPr>
+              <a:t> . . . . . . . . . . . . . . . . . . . . . . . . . . . . . . . . 12</a:t>
+            </a:r>
+          </a:p>
+          <a:p>
+            <a:r>
+              <a:rPr lang="en-US" sz="700" dirty="0" smtClean="0"/>
+              <a:t>    </a:t>
+            </a:r>
+            <a:r>
+              <a:rPr lang="en-US" sz="700" dirty="0" smtClean="0">
+                <a:solidFill>
+                  <a:srgbClr val="00B0F0"/>
+                </a:solidFill>
+              </a:rPr>
+              <a:t>4.5.1 </a:t>
+            </a:r>
+            <a:r>
+              <a:rPr lang="en-US" sz="700" dirty="0">
+                <a:solidFill>
+                  <a:srgbClr val="00B0F0"/>
+                </a:solidFill>
+              </a:rPr>
+              <a:t>Actuator Line Method . . . . . . . . . . . . . . . . . . . . . . . . . . . . . . . . . . . . 12</a:t>
+            </a:r>
+          </a:p>
+          <a:p>
+            <a:r>
+              <a:rPr lang="en-US" sz="700" dirty="0" smtClean="0"/>
+              <a:t>    4.5.2 </a:t>
+            </a:r>
+            <a:r>
+              <a:rPr lang="en-US" sz="700" dirty="0"/>
+              <a:t>Dense core representation as an actuator . . . . . . . . . . . . . . . . . . . . . . . . . . 12</a:t>
+            </a:r>
+          </a:p>
+          <a:p>
+            <a:r>
+              <a:rPr lang="fr-FR" sz="700" dirty="0" smtClean="0"/>
+              <a:t>    4.5.3 </a:t>
+            </a:r>
+            <a:r>
+              <a:rPr lang="fr-FR" sz="700" dirty="0"/>
+              <a:t>Forces </a:t>
+            </a:r>
+            <a:r>
+              <a:rPr lang="fr-FR" sz="700" dirty="0" err="1"/>
+              <a:t>determination</a:t>
+            </a:r>
+            <a:r>
+              <a:rPr lang="fr-FR" sz="700" dirty="0"/>
+              <a:t> . . . . . . . . . . . . . . . . . . . . . . . . . . . . . . . . . . . . . </a:t>
+            </a:r>
+            <a:r>
+              <a:rPr lang="fr-FR" sz="700" dirty="0" smtClean="0"/>
+              <a:t>12</a:t>
+            </a:r>
+            <a:endParaRPr lang="fr-FR" sz="700" dirty="0"/>
+          </a:p>
+          <a:p>
+            <a:r>
+              <a:rPr lang="en-US" sz="700" dirty="0" smtClean="0"/>
+              <a:t>  </a:t>
+            </a:r>
+            <a:r>
+              <a:rPr lang="en-US" sz="700" dirty="0" smtClean="0">
+                <a:solidFill>
+                  <a:srgbClr val="00B050"/>
+                </a:solidFill>
+              </a:rPr>
+              <a:t>4.6 </a:t>
+            </a:r>
+            <a:r>
+              <a:rPr lang="en-US" sz="700" dirty="0">
+                <a:solidFill>
+                  <a:srgbClr val="00B050"/>
+                </a:solidFill>
+              </a:rPr>
+              <a:t>Secondary atomization modeling . . . . . . . . . . . . . . . . . . . . . . . . . . . . . . . . . . 12</a:t>
+            </a:r>
+          </a:p>
+          <a:p>
+            <a:r>
+              <a:rPr lang="en-US" sz="700" dirty="0" smtClean="0">
+                <a:solidFill>
+                  <a:srgbClr val="00B050"/>
+                </a:solidFill>
+              </a:rPr>
+              <a:t>    4.6.1 </a:t>
+            </a:r>
+            <a:r>
+              <a:rPr lang="en-US" sz="700" dirty="0">
+                <a:solidFill>
+                  <a:srgbClr val="00B050"/>
+                </a:solidFill>
+              </a:rPr>
+              <a:t>Taylor Analogy Breakup . . . . . . . . . . . . . . . . . . . . . . . . . . . . . . . . . . . 12</a:t>
+            </a:r>
+          </a:p>
+          <a:p>
+            <a:r>
+              <a:rPr lang="fr-FR" sz="700" dirty="0" smtClean="0">
+                <a:solidFill>
+                  <a:srgbClr val="00B050"/>
+                </a:solidFill>
+              </a:rPr>
+              <a:t>    4.6.2 </a:t>
+            </a:r>
+            <a:r>
+              <a:rPr lang="fr-FR" sz="700" dirty="0" err="1">
+                <a:solidFill>
+                  <a:srgbClr val="00B050"/>
+                </a:solidFill>
+              </a:rPr>
+              <a:t>Enhanced</a:t>
+            </a:r>
+            <a:r>
+              <a:rPr lang="fr-FR" sz="700" dirty="0">
+                <a:solidFill>
+                  <a:srgbClr val="00B050"/>
+                </a:solidFill>
+              </a:rPr>
+              <a:t> TAB model . . . . . . . . . . . . . . . . . . . . . . . . . . . . . . . . . . . . 15</a:t>
+            </a:r>
+          </a:p>
+          <a:p>
+            <a:r>
+              <a:rPr lang="fr-FR" sz="700" dirty="0" smtClean="0">
+                <a:solidFill>
+                  <a:srgbClr val="00B050"/>
+                </a:solidFill>
+              </a:rPr>
+              <a:t>    4.6.3 </a:t>
+            </a:r>
+            <a:r>
+              <a:rPr lang="fr-FR" sz="700" dirty="0" err="1">
+                <a:solidFill>
+                  <a:srgbClr val="00B050"/>
+                </a:solidFill>
+              </a:rPr>
+              <a:t>Gorokhovski</a:t>
+            </a:r>
+            <a:r>
+              <a:rPr lang="fr-FR" sz="700" dirty="0">
+                <a:solidFill>
+                  <a:srgbClr val="00B050"/>
+                </a:solidFill>
+              </a:rPr>
+              <a:t> </a:t>
+            </a:r>
+            <a:r>
+              <a:rPr lang="fr-FR" sz="700" dirty="0" err="1">
+                <a:solidFill>
+                  <a:srgbClr val="00B050"/>
+                </a:solidFill>
+              </a:rPr>
+              <a:t>stochastic</a:t>
+            </a:r>
+            <a:r>
+              <a:rPr lang="fr-FR" sz="700" dirty="0">
+                <a:solidFill>
+                  <a:srgbClr val="00B050"/>
+                </a:solidFill>
+              </a:rPr>
+              <a:t> model . . . . . . . . . . . . . . . . . . . . . . . . . . . . . . . . </a:t>
+            </a:r>
+            <a:r>
+              <a:rPr lang="fr-FR" sz="700" dirty="0" smtClean="0">
+                <a:solidFill>
+                  <a:srgbClr val="00B050"/>
+                </a:solidFill>
+              </a:rPr>
+              <a:t>15</a:t>
+            </a:r>
+          </a:p>
+          <a:p>
+            <a:r>
+              <a:rPr lang="fr-FR" sz="700" strike="sngStrike" dirty="0" smtClean="0"/>
+              <a:t>  4.7 </a:t>
+            </a:r>
+            <a:r>
+              <a:rPr lang="fr-FR" sz="700" strike="sngStrike" dirty="0" err="1"/>
+              <a:t>Subgrid</a:t>
+            </a:r>
+            <a:r>
+              <a:rPr lang="fr-FR" sz="700" strike="sngStrike" dirty="0"/>
+              <a:t> </a:t>
+            </a:r>
+            <a:r>
+              <a:rPr lang="fr-FR" sz="700" strike="sngStrike" dirty="0" err="1"/>
+              <a:t>models</a:t>
+            </a:r>
+            <a:r>
+              <a:rPr lang="fr-FR" sz="700" strike="sngStrike" dirty="0"/>
+              <a:t> for turbulent dispersion . . . . . . . . . . . . . . . . . . . . . . . . . . . . . . 17</a:t>
+            </a:r>
+          </a:p>
+          <a:p>
+            <a:r>
+              <a:rPr lang="fr-FR" sz="700" dirty="0" smtClean="0"/>
+              <a:t>  4.8 </a:t>
+            </a:r>
+            <a:r>
+              <a:rPr lang="fr-FR" sz="700" dirty="0"/>
+              <a:t>Conclusions . . . . . . . . . . . . . . . . . . . . . . . . . . . . . . . . . . . . . . . . . . . . . . </a:t>
+            </a:r>
+            <a:r>
+              <a:rPr lang="fr-FR" sz="700" dirty="0" smtClean="0"/>
+              <a:t>18</a:t>
+            </a:r>
+          </a:p>
+          <a:p>
+            <a:endParaRPr lang="fr-FR" sz="700" dirty="0" smtClean="0"/>
+          </a:p>
+          <a:p>
+            <a:endParaRPr lang="fr-FR" sz="700" dirty="0" smtClean="0"/>
+          </a:p>
+          <a:p>
+            <a:endParaRPr lang="fr-FR" sz="700" dirty="0"/>
+          </a:p>
+          <a:p>
+            <a:endParaRPr lang="fr-FR" sz="700" dirty="0"/>
+          </a:p>
+          <a:p>
+            <a:r>
+              <a:rPr lang="en-US" sz="700" b="1" dirty="0"/>
+              <a:t>5 Learning data from a resolved liquid jet in crossflow 62</a:t>
+            </a:r>
+          </a:p>
+          <a:p>
+            <a:r>
+              <a:rPr lang="fr-FR" sz="700" dirty="0">
+                <a:solidFill>
+                  <a:srgbClr val="00B0F0"/>
+                </a:solidFill>
+              </a:rPr>
+              <a:t>5.1 Introduction . . . . . . . . . . . . . . . . . . . . . . . . . . . . . . . . . . . . . . . . . . . . . . 63</a:t>
+            </a:r>
+          </a:p>
+          <a:p>
+            <a:r>
+              <a:rPr lang="en-US" sz="700" dirty="0">
+                <a:solidFill>
+                  <a:srgbClr val="00B050"/>
+                </a:solidFill>
+              </a:rPr>
+              <a:t>5.2 Experimental test case . . . . . . . . . . . . . . . . . . . . . . . . . . . . . . . . . . . . . . . . 63</a:t>
+            </a:r>
+          </a:p>
+          <a:p>
+            <a:r>
+              <a:rPr lang="fr-FR" sz="700" dirty="0">
+                <a:solidFill>
+                  <a:srgbClr val="00B0F0"/>
+                </a:solidFill>
+              </a:rPr>
+              <a:t>5.3 </a:t>
+            </a:r>
+            <a:r>
+              <a:rPr lang="fr-FR" sz="700" dirty="0" err="1">
+                <a:solidFill>
+                  <a:srgbClr val="00B0F0"/>
+                </a:solidFill>
+              </a:rPr>
+              <a:t>Computational</a:t>
+            </a:r>
+            <a:r>
+              <a:rPr lang="fr-FR" sz="700" dirty="0">
+                <a:solidFill>
+                  <a:srgbClr val="00B0F0"/>
+                </a:solidFill>
+              </a:rPr>
+              <a:t> setup . . . . . . . . . . . . . . . . . . . . . . . . . . . . . . . . . . . . . . . . . 64</a:t>
+            </a:r>
+          </a:p>
+          <a:p>
+            <a:r>
+              <a:rPr lang="en-US" sz="700" dirty="0"/>
+              <a:t>5.4 Tools and methodologies . . . . . . . . . . . . . . . . . . . . . . . . . . . . . . . . . . . . . . . 65</a:t>
+            </a:r>
+          </a:p>
+          <a:p>
+            <a:r>
+              <a:rPr lang="en-US" sz="700" dirty="0" smtClean="0"/>
+              <a:t>  5.4.1 </a:t>
+            </a:r>
+            <a:r>
+              <a:rPr lang="en-US" sz="700" dirty="0"/>
+              <a:t>Spray sampling in resolved simulations . . . . . . . . . . . . . . . . . . . . . . . . . . . 65</a:t>
+            </a:r>
+          </a:p>
+          <a:p>
+            <a:r>
+              <a:rPr lang="en-US" sz="700" dirty="0" smtClean="0"/>
+              <a:t>  5.4.2 </a:t>
+            </a:r>
+            <a:r>
+              <a:rPr lang="en-US" sz="700" dirty="0"/>
+              <a:t>Numerical computation of jet trajectory . . . . . . . . . . . . . . . . . . . . . . . . . . 65</a:t>
+            </a:r>
+          </a:p>
+          <a:p>
+            <a:r>
+              <a:rPr lang="en-US" sz="700" dirty="0" smtClean="0"/>
+              <a:t>  5.4.3 </a:t>
+            </a:r>
+            <a:r>
+              <a:rPr lang="en-US" sz="700" dirty="0"/>
+              <a:t>Direct measurement of liquid fluxes . . . . . . . . . . . . . . . . . . . . . . . . . . . . 66</a:t>
+            </a:r>
+          </a:p>
+          <a:p>
+            <a:r>
+              <a:rPr lang="fr-FR" sz="700" dirty="0"/>
+              <a:t>5.5 </a:t>
+            </a:r>
+            <a:r>
+              <a:rPr lang="fr-FR" sz="700" dirty="0" err="1"/>
+              <a:t>Results</a:t>
+            </a:r>
+            <a:r>
+              <a:rPr lang="fr-FR" sz="700" dirty="0"/>
+              <a:t> . . . . . . . . . . . . . . . . . . . . . . . . . . . . . . . . . . . . . . . . . . . . . . . . . 67</a:t>
+            </a:r>
+          </a:p>
+          <a:p>
+            <a:r>
+              <a:rPr lang="en-US" sz="700" dirty="0" smtClean="0"/>
+              <a:t>  5.5.1 </a:t>
+            </a:r>
+            <a:r>
+              <a:rPr lang="en-US" sz="700" dirty="0"/>
+              <a:t>Jet topology and breakup . . . . . . . . . . . . . . . . . . . . . . . . . . . . . . . . . . 67</a:t>
+            </a:r>
+          </a:p>
+          <a:p>
+            <a:r>
+              <a:rPr lang="en-US" sz="700" dirty="0" smtClean="0"/>
+              <a:t>    5.5.1.1 </a:t>
+            </a:r>
+            <a:r>
+              <a:rPr lang="en-US" sz="700" dirty="0"/>
+              <a:t>Effect of mesh . . . . . . . . . . . . . . . . . . . . . . . . . . . . . . . . . . . 67</a:t>
+            </a:r>
+          </a:p>
+          <a:p>
+            <a:r>
+              <a:rPr lang="en-US" sz="700" dirty="0" smtClean="0"/>
+              <a:t>    5.5.1.2 </a:t>
+            </a:r>
+            <a:r>
+              <a:rPr lang="en-US" sz="700" dirty="0"/>
+              <a:t>Effect of operating point . . . . . . . . . . . . . . . . . . . . . . . . . . . . . 67</a:t>
+            </a:r>
+          </a:p>
+          <a:p>
+            <a:r>
+              <a:rPr lang="en-US" sz="700" dirty="0" smtClean="0"/>
+              <a:t>  5.5.2 </a:t>
+            </a:r>
+            <a:r>
+              <a:rPr lang="en-US" sz="700" dirty="0"/>
+              <a:t>Validation with experimental trajectory . . . . . . . . . . . . . . . . . . . . . . . . . . 67</a:t>
+            </a:r>
+          </a:p>
+          <a:p>
+            <a:r>
+              <a:rPr lang="fr-FR" sz="700" dirty="0" smtClean="0"/>
+              <a:t>  5.5.3 </a:t>
+            </a:r>
+            <a:r>
+              <a:rPr lang="fr-FR" sz="700" dirty="0"/>
+              <a:t>Spray </a:t>
+            </a:r>
+            <a:r>
+              <a:rPr lang="fr-FR" sz="700" dirty="0" err="1"/>
+              <a:t>characterization</a:t>
+            </a:r>
+            <a:r>
+              <a:rPr lang="fr-FR" sz="700" dirty="0"/>
+              <a:t> . . . . . . . . . . . . . . . . . . . . . . . . . . . . . . . . . . . . 67</a:t>
+            </a:r>
+          </a:p>
+          <a:p>
+            <a:r>
+              <a:rPr lang="en-US" sz="700" dirty="0" smtClean="0"/>
+              <a:t>  5.5.4 </a:t>
+            </a:r>
+            <a:r>
+              <a:rPr lang="en-US" sz="700" dirty="0"/>
+              <a:t>Measurement of mass flow rates . . . . . . . . . . . . . . . . . . . . . . . . . . . . . . . 67</a:t>
+            </a:r>
+          </a:p>
+          <a:p>
+            <a:r>
+              <a:rPr lang="en-US" sz="700" dirty="0" smtClean="0"/>
+              <a:t>  5.5.5 </a:t>
+            </a:r>
+            <a:r>
+              <a:rPr lang="en-US" sz="700" dirty="0"/>
+              <a:t>Mass conservation in ACLS . . . . . . . . . . . . . . . . . . . . . . . . . . . . . . . . . 67</a:t>
+            </a:r>
+          </a:p>
+          <a:p>
+            <a:r>
+              <a:rPr lang="fr-FR" sz="700" dirty="0" smtClean="0"/>
+              <a:t>    5.5.5.1 </a:t>
+            </a:r>
+            <a:r>
+              <a:rPr lang="fr-FR" sz="700" dirty="0" err="1"/>
+              <a:t>Droplets</a:t>
+            </a:r>
+            <a:r>
+              <a:rPr lang="fr-FR" sz="700" dirty="0"/>
+              <a:t> size distributions . . . . . . . . . . . . . . . . . . . . . . . . . . . . 67</a:t>
+            </a:r>
+          </a:p>
+          <a:p>
+            <a:r>
+              <a:rPr lang="en-US" sz="700" dirty="0" smtClean="0"/>
+              <a:t>    5.5.5.2 </a:t>
+            </a:r>
+            <a:r>
+              <a:rPr lang="en-US" sz="700" dirty="0"/>
+              <a:t>Definition of characteristic times . . . . . . . . . . . . . . . . . . . . . . . . . 67</a:t>
+            </a:r>
+          </a:p>
+          <a:p>
+            <a:r>
+              <a:rPr lang="en-US" sz="700" dirty="0" smtClean="0"/>
+              <a:t>  5.5.6 </a:t>
+            </a:r>
+            <a:r>
+              <a:rPr lang="en-US" sz="700" dirty="0"/>
+              <a:t>Gaseous field and dense core characterization . . . . . . . . . . . . . . . . . . . . . . . 67</a:t>
+            </a:r>
+          </a:p>
+          <a:p>
+            <a:r>
+              <a:rPr lang="fr-FR" sz="700" dirty="0" smtClean="0"/>
+              <a:t>  5.5.7 </a:t>
+            </a:r>
+            <a:r>
+              <a:rPr lang="fr-FR" sz="700" dirty="0" err="1"/>
+              <a:t>Frequential</a:t>
+            </a:r>
+            <a:r>
+              <a:rPr lang="fr-FR" sz="700" dirty="0"/>
+              <a:t> </a:t>
+            </a:r>
+            <a:r>
+              <a:rPr lang="fr-FR" sz="700" dirty="0" err="1"/>
+              <a:t>analysis</a:t>
+            </a:r>
+            <a:r>
+              <a:rPr lang="fr-FR" sz="700" dirty="0"/>
+              <a:t> . . . . . . . . . . . . . . . . . . . . . . . . . . . . . . . . . . . . . 67</a:t>
+            </a:r>
+          </a:p>
+          <a:p>
+            <a:r>
+              <a:rPr lang="fr-FR" sz="700" dirty="0" smtClean="0"/>
+              <a:t>  5.5.8 </a:t>
+            </a:r>
+            <a:r>
+              <a:rPr lang="fr-FR" sz="700" dirty="0" err="1"/>
+              <a:t>Computational</a:t>
+            </a:r>
+            <a:r>
+              <a:rPr lang="fr-FR" sz="700" dirty="0"/>
+              <a:t> performances . . . . . . . . . . . . . . . . . . . . . . . . . . . . . . . . 69</a:t>
+            </a:r>
+          </a:p>
+          <a:p>
+            <a:r>
+              <a:rPr lang="en-US" sz="700" dirty="0" smtClean="0"/>
+              <a:t>  5.5.9 </a:t>
+            </a:r>
+            <a:r>
+              <a:rPr lang="en-US" sz="700" dirty="0"/>
+              <a:t>Spatial discretization of sprays . . . . . . . . . . . . . . . . . . . . . . . . . . . . . . . 69</a:t>
+            </a:r>
+          </a:p>
+          <a:p>
+            <a:r>
+              <a:rPr lang="fr-FR" sz="700" dirty="0"/>
+              <a:t>5.6 Learning </a:t>
+            </a:r>
+            <a:r>
+              <a:rPr lang="fr-FR" sz="700" dirty="0" err="1"/>
+              <a:t>injectors</a:t>
+            </a:r>
+            <a:r>
+              <a:rPr lang="fr-FR" sz="700" dirty="0"/>
+              <a:t> . . . . . . . . . . . . . . . . . . . . . . . . . . . . . . . . . . . . . . . . . . 69</a:t>
+            </a:r>
+          </a:p>
+          <a:p>
+            <a:r>
+              <a:rPr lang="en-US" sz="700" dirty="0" smtClean="0"/>
+              <a:t>  5.6.1 </a:t>
+            </a:r>
+            <a:r>
+              <a:rPr lang="en-US" sz="700" dirty="0"/>
+              <a:t>Operating point at high We . . . . . . . . . . . . . . . . . . . . . . . . . . . . . . . . . 69</a:t>
+            </a:r>
+          </a:p>
+          <a:p>
+            <a:r>
+              <a:rPr lang="en-US" sz="700" dirty="0" smtClean="0"/>
+              <a:t>  5.6.2 </a:t>
+            </a:r>
+            <a:r>
+              <a:rPr lang="en-US" sz="700" dirty="0"/>
+              <a:t>Operating point at low We . . . . . . . . . . . . . . . . . . . . . . . . . . . . . . . . . 69</a:t>
+            </a:r>
+          </a:p>
+          <a:p>
+            <a:r>
+              <a:rPr lang="fr-FR" sz="700" dirty="0"/>
+              <a:t>5.7 Conclusions . . . . . . . . . . . . . . . . . . . . . . . . . . . . . . . . . . . . . . . . . . . . . . 69</a:t>
+            </a:r>
+            <a:endParaRPr lang="fr-FR" sz="700" dirty="0"/>
+          </a:p>
+        </p:txBody>
+      </p:sp>
     </p:spTree>
     <p:extLst>
       <p:ext uri="{BB962C8B-B14F-4D97-AF65-F5344CB8AC3E}">
@@ -21354,24 +21530,63 @@
           <a:p>
             <a:r>
               <a:rPr lang="fr-FR" sz="800" dirty="0" smtClean="0"/>
-              <a:t>  8.1 </a:t>
-            </a:r>
-            <a:r>
-              <a:rPr lang="fr-FR" sz="800" dirty="0"/>
+              <a:t>  </a:t>
+            </a:r>
+            <a:r>
+              <a:rPr lang="fr-FR" sz="800" dirty="0" smtClean="0">
+                <a:solidFill>
+                  <a:schemeClr val="accent1">
+                    <a:lumMod val="40000"/>
+                    <a:lumOff val="60000"/>
+                  </a:schemeClr>
+                </a:solidFill>
+              </a:rPr>
+              <a:t>8.1 </a:t>
+            </a:r>
+            <a:r>
+              <a:rPr lang="fr-FR" sz="800" dirty="0">
+                <a:solidFill>
+                  <a:schemeClr val="accent1">
+                    <a:lumMod val="40000"/>
+                    <a:lumOff val="60000"/>
+                  </a:schemeClr>
+                </a:solidFill>
+              </a:rPr>
               <a:t>Introduction . . . . . . . . . . . . . . . . . . . . . . . . . . . . . . . . . . . . . . . . . . . . . . 24</a:t>
             </a:r>
           </a:p>
           <a:p>
             <a:r>
-              <a:rPr lang="fr-FR" sz="800" dirty="0" smtClean="0"/>
+              <a:rPr lang="fr-FR" sz="800" dirty="0" smtClean="0">
+                <a:solidFill>
+                  <a:schemeClr val="accent1">
+                    <a:lumMod val="40000"/>
+                    <a:lumOff val="60000"/>
+                  </a:schemeClr>
+                </a:solidFill>
+              </a:rPr>
               <a:t>  8.2 </a:t>
             </a:r>
             <a:r>
-              <a:rPr lang="fr-FR" sz="800" dirty="0" err="1"/>
+              <a:rPr lang="fr-FR" sz="800" dirty="0" err="1">
+                <a:solidFill>
+                  <a:schemeClr val="accent1">
+                    <a:lumMod val="40000"/>
+                    <a:lumOff val="60000"/>
+                  </a:schemeClr>
+                </a:solidFill>
+              </a:rPr>
               <a:t>Numerical</a:t>
             </a:r>
             <a:r>
-              <a:rPr lang="fr-FR" sz="800" dirty="0"/>
+              <a:rPr lang="fr-FR" sz="800" dirty="0">
+                <a:solidFill>
+                  <a:schemeClr val="accent1">
+                    <a:lumMod val="40000"/>
+                    <a:lumOff val="60000"/>
+                  </a:schemeClr>
+                </a:solidFill>
+              </a:rPr>
               <a:t> setup . . . . . . . . . . . . . . . . . . . . . . . . . . . . . . . . . . . . . . . . . . . 24</a:t>
             </a:r>
           </a:p>
@@ -21703,7 +21918,7 @@
           <a:p>
             <a:r>
               <a:rPr lang="fr-FR" sz="700" b="1" dirty="0" smtClean="0"/>
-              <a:t>10 %</a:t>
+              <a:t>15 %</a:t>
             </a:r>
             <a:endParaRPr lang="fr-FR" sz="100" dirty="0"/>
           </a:p>
@@ -21780,7 +21995,7 @@
           <p:spPr>
             <a:xfrm>
               <a:off x="1115616" y="1300690"/>
-              <a:ext cx="123995" cy="216024"/>
+              <a:ext cx="176346" cy="216024"/>
             </a:xfrm>
             <a:prstGeom prst="rect">
               <a:avLst/>
@@ -21826,7 +22041,7 @@
         </p:nvSpPr>
         <p:spPr>
           <a:xfrm>
-            <a:off x="4644008" y="343568"/>
+            <a:off x="4689953" y="343569"/>
             <a:ext cx="340158" cy="200055"/>
           </a:xfrm>
           <a:prstGeom prst="rect">
@@ -21842,7 +22057,7 @@
           <a:p>
             <a:r>
               <a:rPr lang="fr-FR" sz="700" b="1" dirty="0" smtClean="0"/>
-              <a:t>0 %</a:t>
+              <a:t>5 %</a:t>
             </a:r>
             <a:endParaRPr lang="fr-FR" sz="100" dirty="0"/>
           </a:p>
@@ -21856,10 +22071,10 @@
         </p:nvGrpSpPr>
         <p:grpSpPr>
           <a:xfrm>
-            <a:off x="4767969" y="552506"/>
-            <a:ext cx="1080120" cy="147289"/>
+            <a:off x="4767969" y="552507"/>
+            <a:ext cx="1080120" cy="189847"/>
             <a:chOff x="1115616" y="1300690"/>
-            <a:chExt cx="1584176" cy="216024"/>
+            <a:chExt cx="1584176" cy="278442"/>
           </a:xfrm>
         </p:grpSpPr>
         <p:sp>
@@ -21919,7 +22134,7 @@
           <p:spPr>
             <a:xfrm>
               <a:off x="1115616" y="1300690"/>
-              <a:ext cx="67055" cy="216024"/>
+              <a:ext cx="135026" cy="278442"/>
             </a:xfrm>
             <a:prstGeom prst="rect">
               <a:avLst/>
@@ -23325,6 +23540,11 @@
 
 <file path=customXml/item1.xml><?xml version="1.0" encoding="utf-8"?>
 <?mso-contentType ?>
+<SharedContentType xmlns="Microsoft.SharePoint.Taxonomy.ContentTypeSync" SourceId="45132351-61c7-4947-8fdd-28b295696121" ContentTypeId="0x010100D21E0D47AF3242459E2F63E44FCC089100777D7FF5B336497A8022BDD96D52F206" PreviousValue="false"/>
+</file>
+
+<file path=customXml/item2.xml><?xml version="1.0" encoding="utf-8"?>
+<?mso-contentType ?>
 <FormTemplates xmlns="http://schemas.microsoft.com/sharepoint/v3/contenttype/forms">
   <Display>DocumentLibraryForm</Display>
   <Edit>DocumentLibraryForm</Edit>
@@ -23332,12 +23552,79 @@
 </FormTemplates>
 </file>
 
-<file path=customXml/item2.xml><?xml version="1.0" encoding="utf-8"?>
-<?mso-contentType ?>
-<SharedContentType xmlns="Microsoft.SharePoint.Taxonomy.ContentTypeSync" SourceId="45132351-61c7-4947-8fdd-28b295696121" ContentTypeId="0x010100D21E0D47AF3242459E2F63E44FCC089100777D7FF5B336497A8022BDD96D52F206" PreviousValue="false"/>
+<file path=customXml/item3.xml><?xml version="1.0" encoding="utf-8"?>
+<p:properties xmlns:p="http://schemas.microsoft.com/office/2006/metadata/properties" xmlns:xsi="http://www.w3.org/2001/XMLSchema-instance" xmlns:pc="http://schemas.microsoft.com/office/infopath/2007/PartnerControls">
+  <documentManagement>
+    <TaxCatchAllLabel xmlns="594212a7-a8eb-497d-bd6b-0e3a174923ee"/>
+    <hbb7c253cca74a7eb37893d2c784478e xmlns="594212a7-a8eb-497d-bd6b-0e3a174923ee">
+      <Terms xmlns="http://schemas.microsoft.com/office/infopath/2007/PartnerControls">
+        <TermInfo xmlns="http://schemas.microsoft.com/office/infopath/2007/PartnerControls">
+          <TermName xmlns="http://schemas.microsoft.com/office/infopath/2007/PartnerControls">Société de rang 1</TermName>
+          <TermId xmlns="http://schemas.microsoft.com/office/infopath/2007/PartnerControls">153bb90e-11c3-427f-ad6a-31f0311df60b</TermId>
+        </TermInfo>
+      </Terms>
+    </hbb7c253cca74a7eb37893d2c784478e>
+    <PublishingRollupImage xmlns="http://schemas.microsoft.com/sharepoint/v3" xsi:nil="true"/>
+    <j0d00d49c94f4a41889fe0a90686fcf3 xmlns="594212a7-a8eb-497d-bd6b-0e3a174923ee">
+      <Terms xmlns="http://schemas.microsoft.com/office/infopath/2007/PartnerControls">
+        <TermInfo xmlns="http://schemas.microsoft.com/office/infopath/2007/PartnerControls">
+          <TermName xmlns="http://schemas.microsoft.com/office/infopath/2007/PartnerControls">Modèle de PowerPoint</TermName>
+          <TermId xmlns="http://schemas.microsoft.com/office/infopath/2007/PartnerControls">80c833d3-038d-45cb-b65f-a8d2234b6314</TermId>
+        </TermInfo>
+      </Terms>
+    </j0d00d49c94f4a41889fe0a90686fcf3>
+    <bf182a5ee3d048a18e411565aa2e2f45 xmlns="594212a7-a8eb-497d-bd6b-0e3a174923ee">
+      <Terms xmlns="http://schemas.microsoft.com/office/infopath/2007/PartnerControls"/>
+    </bf182a5ee3d048a18e411565aa2e2f45>
+    <e52db41c680243efb0b30a61ab228ec7 xmlns="594212a7-a8eb-497d-bd6b-0e3a174923ee">
+      <Terms xmlns="http://schemas.microsoft.com/office/infopath/2007/PartnerControls"/>
+    </e52db41c680243efb0b30a61ab228ec7>
+    <SAF_RollupImageUrl xmlns="594212a7-a8eb-497d-bd6b-0e3a174923ee" xsi:nil="true"/>
+    <caf53a6a65da4c24b32d62b4b62720b3 xmlns="594212a7-a8eb-497d-bd6b-0e3a174923ee">
+      <Terms xmlns="http://schemas.microsoft.com/office/infopath/2007/PartnerControls"/>
+    </caf53a6a65da4c24b32d62b4b62720b3>
+    <m7fd08401b3947dfa98de00fecb0dae1 xmlns="594212a7-a8eb-497d-bd6b-0e3a174923ee">
+      <Terms xmlns="http://schemas.microsoft.com/office/infopath/2007/PartnerControls"/>
+    </m7fd08401b3947dfa98de00fecb0dae1>
+    <ad37d51a25df4e05a3b157053c5270a3 xmlns="594212a7-a8eb-497d-bd6b-0e3a174923ee">
+      <Terms xmlns="http://schemas.microsoft.com/office/infopath/2007/PartnerControls"/>
+    </ad37d51a25df4e05a3b157053c5270a3>
+    <SAF_DateDeMiseAJour xmlns="594212a7-a8eb-497d-bd6b-0e3a174923ee">2017-12-05T23:00:00+00:00</SAF_DateDeMiseAJour>
+    <a825e358ec1643889847765ed6ff8a73 xmlns="594212a7-a8eb-497d-bd6b-0e3a174923ee">
+      <Terms xmlns="http://schemas.microsoft.com/office/infopath/2007/PartnerControls"/>
+    </a825e358ec1643889847765ed6ff8a73>
+    <SAF_Auteur xmlns="594212a7-a8eb-497d-bd6b-0e3a174923ee" xsi:nil="true"/>
+    <Audience xmlns="http://schemas.microsoft.com/sharepoint/v3">a14e28f2-7f35-472e-920e-eb355f588917;;;;</Audience>
+    <TaxCatchAll xmlns="594212a7-a8eb-497d-bd6b-0e3a174923ee">
+      <Value>13</Value>
+      <Value>4</Value>
+      <Value>2</Value>
+    </TaxCatchAll>
+    <SharePoint_Group_Language xmlns="594212a7-a8eb-497d-bd6b-0e3a174923ee">0</SharePoint_Group_Language>
+    <e2fa6dee792b43efac6bb28cb4245109 xmlns="594212a7-a8eb-497d-bd6b-0e3a174923ee">
+      <Terms xmlns="http://schemas.microsoft.com/office/infopath/2007/PartnerControls">
+        <TermInfo xmlns="http://schemas.microsoft.com/office/infopath/2007/PartnerControls">
+          <TermName xmlns="http://schemas.microsoft.com/office/infopath/2007/PartnerControls">Safran SA</TermName>
+          <TermId xmlns="http://schemas.microsoft.com/office/infopath/2007/PartnerControls">aaa54815-a829-4454-b47a-5471280a13ab</TermId>
+        </TermInfo>
+      </Terms>
+    </e2fa6dee792b43efac6bb28cb4245109>
+    <fd69f967cfe64500a3ea9d72cb3281b0 xmlns="594212a7-a8eb-497d-bd6b-0e3a174923ee">
+      <Terms xmlns="http://schemas.microsoft.com/office/infopath/2007/PartnerControls"/>
+    </fd69f967cfe64500a3ea9d72cb3281b0>
+    <SAF_Descriptif xmlns="594212a7-a8eb-497d-bd6b-0e3a174923ee">MODELE POWERPOINT - SAFRAN</SAF_Descriptif>
+    <TaxKeywordTaxHTField xmlns="594212a7-a8eb-497d-bd6b-0e3a174923ee">
+      <Terms xmlns="http://schemas.microsoft.com/office/infopath/2007/PartnerControls"/>
+    </TaxKeywordTaxHTField>
+    <l0cedefb36e74dc2b968aa0e806ff5e3 xmlns="594212a7-a8eb-497d-bd6b-0e3a174923ee">
+      <Terms xmlns="http://schemas.microsoft.com/office/infopath/2007/PartnerControls"/>
+    </l0cedefb36e74dc2b968aa0e806ff5e3>
+    <SharePoint_Item_Language xmlns="594212a7-a8eb-497d-bd6b-0e3a174923ee">FR</SharePoint_Item_Language>
+  </documentManagement>
+</p:properties>
 </file>
 
-<file path=customXml/item3.xml><?xml version="1.0" encoding="utf-8"?>
+<file path=customXml/item4.xml><?xml version="1.0" encoding="utf-8"?>
 <ct:contentTypeSchema xmlns:ct="http://schemas.microsoft.com/office/2006/metadata/contentType" xmlns:ma="http://schemas.microsoft.com/office/2006/metadata/properties/metaAttributes" ct:_="" ma:_="" ma:contentTypeName="Insite document" ma:contentTypeID="0x010100D21E0D47AF3242459E2F63E44FCC089100777D7FF5B336497A8022BDD96D52F20600200793A640610C4398BA0220248CC219" ma:contentTypeVersion="22" ma:contentTypeDescription="Create Insite document" ma:contentTypeScope="" ma:versionID="032b97a2f15e5661ca0fa000ac2738a1">
   <xsd:schema xmlns:xsd="http://www.w3.org/2001/XMLSchema" xmlns:xs="http://www.w3.org/2001/XMLSchema" xmlns:p="http://schemas.microsoft.com/office/2006/metadata/properties" xmlns:ns1="http://schemas.microsoft.com/sharepoint/v3" xmlns:ns2="594212a7-a8eb-497d-bd6b-0e3a174923ee" targetNamespace="http://schemas.microsoft.com/office/2006/metadata/properties" ma:root="true" ma:fieldsID="fcc802b47a8da61df372a5b0ec1371ba" ns1:_="" ns2:_="">
     <xsd:import namespace="http://schemas.microsoft.com/sharepoint/v3"/>
@@ -23638,79 +23925,15 @@
 </ct:contentTypeSchema>
 </file>
 
-<file path=customXml/item4.xml><?xml version="1.0" encoding="utf-8"?>
-<p:properties xmlns:p="http://schemas.microsoft.com/office/2006/metadata/properties" xmlns:xsi="http://www.w3.org/2001/XMLSchema-instance" xmlns:pc="http://schemas.microsoft.com/office/infopath/2007/PartnerControls">
-  <documentManagement>
-    <TaxCatchAllLabel xmlns="594212a7-a8eb-497d-bd6b-0e3a174923ee"/>
-    <hbb7c253cca74a7eb37893d2c784478e xmlns="594212a7-a8eb-497d-bd6b-0e3a174923ee">
-      <Terms xmlns="http://schemas.microsoft.com/office/infopath/2007/PartnerControls">
-        <TermInfo xmlns="http://schemas.microsoft.com/office/infopath/2007/PartnerControls">
-          <TermName xmlns="http://schemas.microsoft.com/office/infopath/2007/PartnerControls">Société de rang 1</TermName>
-          <TermId xmlns="http://schemas.microsoft.com/office/infopath/2007/PartnerControls">153bb90e-11c3-427f-ad6a-31f0311df60b</TermId>
-        </TermInfo>
-      </Terms>
-    </hbb7c253cca74a7eb37893d2c784478e>
-    <PublishingRollupImage xmlns="http://schemas.microsoft.com/sharepoint/v3" xsi:nil="true"/>
-    <j0d00d49c94f4a41889fe0a90686fcf3 xmlns="594212a7-a8eb-497d-bd6b-0e3a174923ee">
-      <Terms xmlns="http://schemas.microsoft.com/office/infopath/2007/PartnerControls">
-        <TermInfo xmlns="http://schemas.microsoft.com/office/infopath/2007/PartnerControls">
-          <TermName xmlns="http://schemas.microsoft.com/office/infopath/2007/PartnerControls">Modèle de PowerPoint</TermName>
-          <TermId xmlns="http://schemas.microsoft.com/office/infopath/2007/PartnerControls">80c833d3-038d-45cb-b65f-a8d2234b6314</TermId>
-        </TermInfo>
-      </Terms>
-    </j0d00d49c94f4a41889fe0a90686fcf3>
-    <bf182a5ee3d048a18e411565aa2e2f45 xmlns="594212a7-a8eb-497d-bd6b-0e3a174923ee">
-      <Terms xmlns="http://schemas.microsoft.com/office/infopath/2007/PartnerControls"/>
-    </bf182a5ee3d048a18e411565aa2e2f45>
-    <e52db41c680243efb0b30a61ab228ec7 xmlns="594212a7-a8eb-497d-bd6b-0e3a174923ee">
-      <Terms xmlns="http://schemas.microsoft.com/office/infopath/2007/PartnerControls"/>
-    </e52db41c680243efb0b30a61ab228ec7>
-    <SAF_RollupImageUrl xmlns="594212a7-a8eb-497d-bd6b-0e3a174923ee" xsi:nil="true"/>
-    <caf53a6a65da4c24b32d62b4b62720b3 xmlns="594212a7-a8eb-497d-bd6b-0e3a174923ee">
-      <Terms xmlns="http://schemas.microsoft.com/office/infopath/2007/PartnerControls"/>
-    </caf53a6a65da4c24b32d62b4b62720b3>
-    <m7fd08401b3947dfa98de00fecb0dae1 xmlns="594212a7-a8eb-497d-bd6b-0e3a174923ee">
-      <Terms xmlns="http://schemas.microsoft.com/office/infopath/2007/PartnerControls"/>
-    </m7fd08401b3947dfa98de00fecb0dae1>
-    <ad37d51a25df4e05a3b157053c5270a3 xmlns="594212a7-a8eb-497d-bd6b-0e3a174923ee">
-      <Terms xmlns="http://schemas.microsoft.com/office/infopath/2007/PartnerControls"/>
-    </ad37d51a25df4e05a3b157053c5270a3>
-    <SAF_DateDeMiseAJour xmlns="594212a7-a8eb-497d-bd6b-0e3a174923ee">2017-12-05T23:00:00+00:00</SAF_DateDeMiseAJour>
-    <a825e358ec1643889847765ed6ff8a73 xmlns="594212a7-a8eb-497d-bd6b-0e3a174923ee">
-      <Terms xmlns="http://schemas.microsoft.com/office/infopath/2007/PartnerControls"/>
-    </a825e358ec1643889847765ed6ff8a73>
-    <SAF_Auteur xmlns="594212a7-a8eb-497d-bd6b-0e3a174923ee" xsi:nil="true"/>
-    <Audience xmlns="http://schemas.microsoft.com/sharepoint/v3">a14e28f2-7f35-472e-920e-eb355f588917;;;;</Audience>
-    <TaxCatchAll xmlns="594212a7-a8eb-497d-bd6b-0e3a174923ee">
-      <Value>13</Value>
-      <Value>4</Value>
-      <Value>2</Value>
-    </TaxCatchAll>
-    <SharePoint_Group_Language xmlns="594212a7-a8eb-497d-bd6b-0e3a174923ee">0</SharePoint_Group_Language>
-    <e2fa6dee792b43efac6bb28cb4245109 xmlns="594212a7-a8eb-497d-bd6b-0e3a174923ee">
-      <Terms xmlns="http://schemas.microsoft.com/office/infopath/2007/PartnerControls">
-        <TermInfo xmlns="http://schemas.microsoft.com/office/infopath/2007/PartnerControls">
-          <TermName xmlns="http://schemas.microsoft.com/office/infopath/2007/PartnerControls">Safran SA</TermName>
-          <TermId xmlns="http://schemas.microsoft.com/office/infopath/2007/PartnerControls">aaa54815-a829-4454-b47a-5471280a13ab</TermId>
-        </TermInfo>
-      </Terms>
-    </e2fa6dee792b43efac6bb28cb4245109>
-    <fd69f967cfe64500a3ea9d72cb3281b0 xmlns="594212a7-a8eb-497d-bd6b-0e3a174923ee">
-      <Terms xmlns="http://schemas.microsoft.com/office/infopath/2007/PartnerControls"/>
-    </fd69f967cfe64500a3ea9d72cb3281b0>
-    <SAF_Descriptif xmlns="594212a7-a8eb-497d-bd6b-0e3a174923ee">MODELE POWERPOINT - SAFRAN</SAF_Descriptif>
-    <TaxKeywordTaxHTField xmlns="594212a7-a8eb-497d-bd6b-0e3a174923ee">
-      <Terms xmlns="http://schemas.microsoft.com/office/infopath/2007/PartnerControls"/>
-    </TaxKeywordTaxHTField>
-    <l0cedefb36e74dc2b968aa0e806ff5e3 xmlns="594212a7-a8eb-497d-bd6b-0e3a174923ee">
-      <Terms xmlns="http://schemas.microsoft.com/office/infopath/2007/PartnerControls"/>
-    </l0cedefb36e74dc2b968aa0e806ff5e3>
-    <SharePoint_Item_Language xmlns="594212a7-a8eb-497d-bd6b-0e3a174923ee">FR</SharePoint_Item_Language>
-  </documentManagement>
-</p:properties>
+<file path=customXml/itemProps1.xml><?xml version="1.0" encoding="utf-8"?>
+<ds:datastoreItem xmlns:ds="http://schemas.openxmlformats.org/officeDocument/2006/customXml" ds:itemID="{0A838253-757E-43D6-95F9-1423CFF29EBD}">
+  <ds:schemaRefs>
+    <ds:schemaRef ds:uri="Microsoft.SharePoint.Taxonomy.ContentTypeSync"/>
+  </ds:schemaRefs>
+</ds:datastoreItem>
 </file>
 
-<file path=customXml/itemProps1.xml><?xml version="1.0" encoding="utf-8"?>
+<file path=customXml/itemProps2.xml><?xml version="1.0" encoding="utf-8"?>
 <ds:datastoreItem xmlns:ds="http://schemas.openxmlformats.org/officeDocument/2006/customXml" ds:itemID="{0F8E8D54-22DD-435F-B0BC-857E14266D0E}">
   <ds:schemaRefs>
     <ds:schemaRef ds:uri="http://schemas.microsoft.com/sharepoint/v3/contenttype/forms"/>
@@ -23718,15 +23941,24 @@
 </ds:datastoreItem>
 </file>
 
-<file path=customXml/itemProps2.xml><?xml version="1.0" encoding="utf-8"?>
-<ds:datastoreItem xmlns:ds="http://schemas.openxmlformats.org/officeDocument/2006/customXml" ds:itemID="{0A838253-757E-43D6-95F9-1423CFF29EBD}">
+<file path=customXml/itemProps3.xml><?xml version="1.0" encoding="utf-8"?>
+<ds:datastoreItem xmlns:ds="http://schemas.openxmlformats.org/officeDocument/2006/customXml" ds:itemID="{D49C4E90-7152-457B-8ABA-0A464531BBF0}">
   <ds:schemaRefs>
-    <ds:schemaRef ds:uri="Microsoft.SharePoint.Taxonomy.ContentTypeSync"/>
+    <ds:schemaRef ds:uri="http://schemas.microsoft.com/office/infopath/2007/PartnerControls"/>
+    <ds:schemaRef ds:uri="http://purl.org/dc/elements/1.1/"/>
+    <ds:schemaRef ds:uri="http://schemas.microsoft.com/sharepoint/v3"/>
+    <ds:schemaRef ds:uri="http://schemas.microsoft.com/office/2006/documentManagement/types"/>
+    <ds:schemaRef ds:uri="594212a7-a8eb-497d-bd6b-0e3a174923ee"/>
+    <ds:schemaRef ds:uri="http://purl.org/dc/dcmitype/"/>
+    <ds:schemaRef ds:uri="http://schemas.openxmlformats.org/package/2006/metadata/core-properties"/>
+    <ds:schemaRef ds:uri="http://schemas.microsoft.com/office/2006/metadata/properties"/>
+    <ds:schemaRef ds:uri="http://www.w3.org/XML/1998/namespace"/>
+    <ds:schemaRef ds:uri="http://purl.org/dc/terms/"/>
   </ds:schemaRefs>
 </ds:datastoreItem>
 </file>
 
-<file path=customXml/itemProps3.xml><?xml version="1.0" encoding="utf-8"?>
+<file path=customXml/itemProps4.xml><?xml version="1.0" encoding="utf-8"?>
 <ds:datastoreItem xmlns:ds="http://schemas.openxmlformats.org/officeDocument/2006/customXml" ds:itemID="{F698CC1E-11F0-453E-939E-E7CFB437D6BB}">
   <ds:schemaRefs>
     <ds:schemaRef ds:uri="http://schemas.microsoft.com/office/2006/metadata/contentType"/>
@@ -23743,21 +23975,4 @@
     <ds:schemaRef ds:uri="http://schemas.microsoft.com/internal/obd"/>
   </ds:schemaRefs>
 </ds:datastoreItem>
-</file>
-
-<file path=customXml/itemProps4.xml><?xml version="1.0" encoding="utf-8"?>
-<ds:datastoreItem xmlns:ds="http://schemas.openxmlformats.org/officeDocument/2006/customXml" ds:itemID="{D49C4E90-7152-457B-8ABA-0A464531BBF0}">
-  <ds:schemaRefs>
-    <ds:schemaRef ds:uri="http://schemas.microsoft.com/office/infopath/2007/PartnerControls"/>
-    <ds:schemaRef ds:uri="http://purl.org/dc/elements/1.1/"/>
-    <ds:schemaRef ds:uri="http://schemas.microsoft.com/sharepoint/v3"/>
-    <ds:schemaRef ds:uri="http://schemas.microsoft.com/office/2006/documentManagement/types"/>
-    <ds:schemaRef ds:uri="594212a7-a8eb-497d-bd6b-0e3a174923ee"/>
-    <ds:schemaRef ds:uri="http://purl.org/dc/dcmitype/"/>
-    <ds:schemaRef ds:uri="http://schemas.openxmlformats.org/package/2006/metadata/core-properties"/>
-    <ds:schemaRef ds:uri="http://schemas.microsoft.com/office/2006/metadata/properties"/>
-    <ds:schemaRef ds:uri="http://www.w3.org/XML/1998/namespace"/>
-    <ds:schemaRef ds:uri="http://purl.org/dc/terms/"/>
-  </ds:schemaRefs>
-</ds:datastoreItem>
 </file>
</xml_diff>